<commit_message>
modify bitwidth, record simulation data
</commit_message>
<xml_diff>
--- a/多核心系統_final.pptx
+++ b/多核心系統_final.pptx
@@ -31,14 +31,14 @@
     <p:sldId id="269" r:id="rId22"/>
     <p:sldId id="279" r:id="rId23"/>
     <p:sldId id="294" r:id="rId24"/>
-    <p:sldId id="295" r:id="rId25"/>
-    <p:sldId id="281" r:id="rId26"/>
-    <p:sldId id="285" r:id="rId27"/>
-    <p:sldId id="288" r:id="rId28"/>
-    <p:sldId id="286" r:id="rId29"/>
-    <p:sldId id="287" r:id="rId30"/>
-    <p:sldId id="293" r:id="rId31"/>
-    <p:sldId id="292" r:id="rId32"/>
+    <p:sldId id="281" r:id="rId25"/>
+    <p:sldId id="285" r:id="rId26"/>
+    <p:sldId id="286" r:id="rId27"/>
+    <p:sldId id="295" r:id="rId28"/>
+    <p:sldId id="292" r:id="rId29"/>
+    <p:sldId id="296" r:id="rId30"/>
+    <p:sldId id="297" r:id="rId31"/>
+    <p:sldId id="298" r:id="rId32"/>
     <p:sldId id="289" r:id="rId33"/>
     <p:sldId id="291" r:id="rId34"/>
   </p:sldIdLst>
@@ -229,7 +229,7 @@
           <a:p>
             <a:fld id="{1E43FED8-ADC9-40B5-9D7E-B88F0C96D1CC}" type="datetimeFigureOut">
               <a:rPr lang="zh-TW" altLang="en-US" smtClean="0"/>
-              <a:t>2021/6/18</a:t>
+              <a:t>2021/6/19</a:t>
             </a:fld>
             <a:endParaRPr lang="zh-TW" altLang="en-US"/>
           </a:p>
@@ -847,6 +847,174 @@
     <p:extLst>
       <p:ext uri="{BB962C8B-B14F-4D97-AF65-F5344CB8AC3E}">
         <p14:creationId xmlns:p14="http://schemas.microsoft.com/office/powerpoint/2010/main" val="581000749"/>
+      </p:ext>
+    </p:extLst>
+  </p:cSld>
+  <p:clrMapOvr>
+    <a:masterClrMapping/>
+  </p:clrMapOvr>
+</p:notes>
+</file>
+
+<file path=ppt/notesSlides/notesSlide5.xml><?xml version="1.0" encoding="utf-8"?>
+<p:notes xmlns:a="http://schemas.openxmlformats.org/drawingml/2006/main" xmlns:r="http://schemas.openxmlformats.org/officeDocument/2006/relationships" xmlns:p="http://schemas.openxmlformats.org/presentationml/2006/main">
+  <p:cSld>
+    <p:spTree>
+      <p:nvGrpSpPr>
+        <p:cNvPr id="1" name=""/>
+        <p:cNvGrpSpPr/>
+        <p:nvPr/>
+      </p:nvGrpSpPr>
+      <p:grpSpPr>
+        <a:xfrm>
+          <a:off x="0" y="0"/>
+          <a:ext cx="0" cy="0"/>
+          <a:chOff x="0" y="0"/>
+          <a:chExt cx="0" cy="0"/>
+        </a:xfrm>
+      </p:grpSpPr>
+      <p:sp>
+        <p:nvSpPr>
+          <p:cNvPr id="2" name="投影片影像版面配置區 1"/>
+          <p:cNvSpPr>
+            <a:spLocks noGrp="1" noRot="1" noChangeAspect="1"/>
+          </p:cNvSpPr>
+          <p:nvPr>
+            <p:ph type="sldImg"/>
+          </p:nvPr>
+        </p:nvSpPr>
+        <p:spPr/>
+      </p:sp>
+      <p:sp>
+        <p:nvSpPr>
+          <p:cNvPr id="3" name="備忘稿版面配置區 2"/>
+          <p:cNvSpPr>
+            <a:spLocks noGrp="1"/>
+          </p:cNvSpPr>
+          <p:nvPr>
+            <p:ph type="body" idx="1"/>
+          </p:nvPr>
+        </p:nvSpPr>
+        <p:spPr/>
+        <p:txBody>
+          <a:bodyPr/>
+          <a:lstStyle/>
+          <a:p>
+            <a:endParaRPr lang="zh-TW" altLang="en-US" dirty="0"/>
+          </a:p>
+        </p:txBody>
+      </p:sp>
+      <p:sp>
+        <p:nvSpPr>
+          <p:cNvPr id="4" name="投影片編號版面配置區 3"/>
+          <p:cNvSpPr>
+            <a:spLocks noGrp="1"/>
+          </p:cNvSpPr>
+          <p:nvPr>
+            <p:ph type="sldNum" sz="quarter" idx="5"/>
+          </p:nvPr>
+        </p:nvSpPr>
+        <p:spPr/>
+        <p:txBody>
+          <a:bodyPr/>
+          <a:lstStyle/>
+          <a:p>
+            <a:fld id="{5A334B83-B047-490E-A562-EE3DDDC541A7}" type="slidenum">
+              <a:rPr lang="zh-TW" altLang="en-US" smtClean="0"/>
+              <a:t>26</a:t>
+            </a:fld>
+            <a:endParaRPr lang="zh-TW" altLang="en-US"/>
+          </a:p>
+        </p:txBody>
+      </p:sp>
+    </p:spTree>
+    <p:extLst>
+      <p:ext uri="{BB962C8B-B14F-4D97-AF65-F5344CB8AC3E}">
+        <p14:creationId xmlns:p14="http://schemas.microsoft.com/office/powerpoint/2010/main" val="2340415269"/>
+      </p:ext>
+    </p:extLst>
+  </p:cSld>
+  <p:clrMapOvr>
+    <a:masterClrMapping/>
+  </p:clrMapOvr>
+</p:notes>
+</file>
+
+<file path=ppt/notesSlides/notesSlide6.xml><?xml version="1.0" encoding="utf-8"?>
+<p:notes xmlns:a="http://schemas.openxmlformats.org/drawingml/2006/main" xmlns:r="http://schemas.openxmlformats.org/officeDocument/2006/relationships" xmlns:p="http://schemas.openxmlformats.org/presentationml/2006/main">
+  <p:cSld>
+    <p:spTree>
+      <p:nvGrpSpPr>
+        <p:cNvPr id="1" name=""/>
+        <p:cNvGrpSpPr/>
+        <p:nvPr/>
+      </p:nvGrpSpPr>
+      <p:grpSpPr>
+        <a:xfrm>
+          <a:off x="0" y="0"/>
+          <a:ext cx="0" cy="0"/>
+          <a:chOff x="0" y="0"/>
+          <a:chExt cx="0" cy="0"/>
+        </a:xfrm>
+      </p:grpSpPr>
+      <p:sp>
+        <p:nvSpPr>
+          <p:cNvPr id="2" name="投影片影像版面配置區 1"/>
+          <p:cNvSpPr>
+            <a:spLocks noGrp="1" noRot="1" noChangeAspect="1"/>
+          </p:cNvSpPr>
+          <p:nvPr>
+            <p:ph type="sldImg"/>
+          </p:nvPr>
+        </p:nvSpPr>
+        <p:spPr/>
+      </p:sp>
+      <p:sp>
+        <p:nvSpPr>
+          <p:cNvPr id="3" name="備忘稿版面配置區 2"/>
+          <p:cNvSpPr>
+            <a:spLocks noGrp="1"/>
+          </p:cNvSpPr>
+          <p:nvPr>
+            <p:ph type="body" idx="1"/>
+          </p:nvPr>
+        </p:nvSpPr>
+        <p:spPr/>
+        <p:txBody>
+          <a:bodyPr/>
+          <a:lstStyle/>
+          <a:p>
+            <a:endParaRPr lang="zh-TW" altLang="en-US" dirty="0"/>
+          </a:p>
+        </p:txBody>
+      </p:sp>
+      <p:sp>
+        <p:nvSpPr>
+          <p:cNvPr id="4" name="投影片編號版面配置區 3"/>
+          <p:cNvSpPr>
+            <a:spLocks noGrp="1"/>
+          </p:cNvSpPr>
+          <p:nvPr>
+            <p:ph type="sldNum" sz="quarter" idx="5"/>
+          </p:nvPr>
+        </p:nvSpPr>
+        <p:spPr/>
+        <p:txBody>
+          <a:bodyPr/>
+          <a:lstStyle/>
+          <a:p>
+            <a:fld id="{5A334B83-B047-490E-A562-EE3DDDC541A7}" type="slidenum">
+              <a:rPr lang="zh-TW" altLang="en-US" smtClean="0"/>
+              <a:t>27</a:t>
+            </a:fld>
+            <a:endParaRPr lang="zh-TW" altLang="en-US"/>
+          </a:p>
+        </p:txBody>
+      </p:sp>
+    </p:spTree>
+    <p:extLst>
+      <p:ext uri="{BB962C8B-B14F-4D97-AF65-F5344CB8AC3E}">
+        <p14:creationId xmlns:p14="http://schemas.microsoft.com/office/powerpoint/2010/main" val="2490681953"/>
       </p:ext>
     </p:extLst>
   </p:cSld>
@@ -1578,7 +1746,7 @@
           <a:p>
             <a:fld id="{A91309BD-70CD-4B7F-8A61-A942BBE06BFC}" type="datetimeFigureOut">
               <a:rPr lang="zh-TW" altLang="en-US" smtClean="0"/>
-              <a:t>2021/6/18</a:t>
+              <a:t>2021/6/19</a:t>
             </a:fld>
             <a:endParaRPr lang="zh-TW" altLang="en-US"/>
           </a:p>
@@ -1829,7 +1997,7 @@
           <a:p>
             <a:fld id="{A91309BD-70CD-4B7F-8A61-A942BBE06BFC}" type="datetimeFigureOut">
               <a:rPr lang="zh-TW" altLang="en-US" smtClean="0"/>
-              <a:t>2021/6/18</a:t>
+              <a:t>2021/6/19</a:t>
             </a:fld>
             <a:endParaRPr lang="zh-TW" altLang="en-US"/>
           </a:p>
@@ -2143,7 +2311,7 @@
           <a:p>
             <a:fld id="{A91309BD-70CD-4B7F-8A61-A942BBE06BFC}" type="datetimeFigureOut">
               <a:rPr lang="zh-TW" altLang="en-US" smtClean="0"/>
-              <a:t>2021/6/18</a:t>
+              <a:t>2021/6/19</a:t>
             </a:fld>
             <a:endParaRPr lang="zh-TW" altLang="en-US"/>
           </a:p>
@@ -2484,7 +2652,7 @@
           <a:p>
             <a:fld id="{A91309BD-70CD-4B7F-8A61-A942BBE06BFC}" type="datetimeFigureOut">
               <a:rPr lang="zh-TW" altLang="en-US" smtClean="0"/>
-              <a:t>2021/6/18</a:t>
+              <a:t>2021/6/19</a:t>
             </a:fld>
             <a:endParaRPr lang="zh-TW" altLang="en-US"/>
           </a:p>
@@ -2798,7 +2966,7 @@
           <a:p>
             <a:fld id="{A91309BD-70CD-4B7F-8A61-A942BBE06BFC}" type="datetimeFigureOut">
               <a:rPr lang="zh-TW" altLang="en-US" smtClean="0"/>
-              <a:t>2021/6/18</a:t>
+              <a:t>2021/6/19</a:t>
             </a:fld>
             <a:endParaRPr lang="zh-TW" altLang="en-US"/>
           </a:p>
@@ -3191,7 +3359,7 @@
           <a:p>
             <a:fld id="{A91309BD-70CD-4B7F-8A61-A942BBE06BFC}" type="datetimeFigureOut">
               <a:rPr lang="zh-TW" altLang="en-US" smtClean="0"/>
-              <a:t>2021/6/18</a:t>
+              <a:t>2021/6/19</a:t>
             </a:fld>
             <a:endParaRPr lang="zh-TW" altLang="en-US"/>
           </a:p>
@@ -3361,7 +3529,7 @@
           <a:p>
             <a:fld id="{A91309BD-70CD-4B7F-8A61-A942BBE06BFC}" type="datetimeFigureOut">
               <a:rPr lang="zh-TW" altLang="en-US" smtClean="0"/>
-              <a:t>2021/6/18</a:t>
+              <a:t>2021/6/19</a:t>
             </a:fld>
             <a:endParaRPr lang="zh-TW" altLang="en-US"/>
           </a:p>
@@ -3541,7 +3709,7 @@
           <a:p>
             <a:fld id="{A91309BD-70CD-4B7F-8A61-A942BBE06BFC}" type="datetimeFigureOut">
               <a:rPr lang="zh-TW" altLang="en-US" smtClean="0"/>
-              <a:t>2021/6/18</a:t>
+              <a:t>2021/6/19</a:t>
             </a:fld>
             <a:endParaRPr lang="zh-TW" altLang="en-US"/>
           </a:p>
@@ -3717,7 +3885,7 @@
           <a:p>
             <a:fld id="{A91309BD-70CD-4B7F-8A61-A942BBE06BFC}" type="datetimeFigureOut">
               <a:rPr lang="zh-TW" altLang="en-US" smtClean="0"/>
-              <a:t>2021/6/18</a:t>
+              <a:t>2021/6/19</a:t>
             </a:fld>
             <a:endParaRPr lang="zh-TW" altLang="en-US"/>
           </a:p>
@@ -3964,7 +4132,7 @@
           <a:p>
             <a:fld id="{A91309BD-70CD-4B7F-8A61-A942BBE06BFC}" type="datetimeFigureOut">
               <a:rPr lang="zh-TW" altLang="en-US" smtClean="0"/>
-              <a:t>2021/6/18</a:t>
+              <a:t>2021/6/19</a:t>
             </a:fld>
             <a:endParaRPr lang="zh-TW" altLang="en-US"/>
           </a:p>
@@ -4196,7 +4364,7 @@
           <a:p>
             <a:fld id="{A91309BD-70CD-4B7F-8A61-A942BBE06BFC}" type="datetimeFigureOut">
               <a:rPr lang="zh-TW" altLang="en-US" smtClean="0"/>
-              <a:t>2021/6/18</a:t>
+              <a:t>2021/6/19</a:t>
             </a:fld>
             <a:endParaRPr lang="zh-TW" altLang="en-US"/>
           </a:p>
@@ -4570,7 +4738,7 @@
           <a:p>
             <a:fld id="{A91309BD-70CD-4B7F-8A61-A942BBE06BFC}" type="datetimeFigureOut">
               <a:rPr lang="zh-TW" altLang="en-US" smtClean="0"/>
-              <a:t>2021/6/18</a:t>
+              <a:t>2021/6/19</a:t>
             </a:fld>
             <a:endParaRPr lang="zh-TW" altLang="en-US"/>
           </a:p>
@@ -4693,7 +4861,7 @@
           <a:p>
             <a:fld id="{A91309BD-70CD-4B7F-8A61-A942BBE06BFC}" type="datetimeFigureOut">
               <a:rPr lang="zh-TW" altLang="en-US" smtClean="0"/>
-              <a:t>2021/6/18</a:t>
+              <a:t>2021/6/19</a:t>
             </a:fld>
             <a:endParaRPr lang="zh-TW" altLang="en-US"/>
           </a:p>
@@ -4788,7 +4956,7 @@
           <a:p>
             <a:fld id="{A91309BD-70CD-4B7F-8A61-A942BBE06BFC}" type="datetimeFigureOut">
               <a:rPr lang="zh-TW" altLang="en-US" smtClean="0"/>
-              <a:t>2021/6/18</a:t>
+              <a:t>2021/6/19</a:t>
             </a:fld>
             <a:endParaRPr lang="zh-TW" altLang="en-US"/>
           </a:p>
@@ -5043,7 +5211,7 @@
           <a:p>
             <a:fld id="{A91309BD-70CD-4B7F-8A61-A942BBE06BFC}" type="datetimeFigureOut">
               <a:rPr lang="zh-TW" altLang="en-US" smtClean="0"/>
-              <a:t>2021/6/18</a:t>
+              <a:t>2021/6/19</a:t>
             </a:fld>
             <a:endParaRPr lang="zh-TW" altLang="en-US"/>
           </a:p>
@@ -5306,7 +5474,7 @@
           <a:p>
             <a:fld id="{A91309BD-70CD-4B7F-8A61-A942BBE06BFC}" type="datetimeFigureOut">
               <a:rPr lang="zh-TW" altLang="en-US" smtClean="0"/>
-              <a:t>2021/6/18</a:t>
+              <a:t>2021/6/19</a:t>
             </a:fld>
             <a:endParaRPr lang="zh-TW" altLang="en-US"/>
           </a:p>
@@ -6049,7 +6217,7 @@
           <a:p>
             <a:fld id="{A91309BD-70CD-4B7F-8A61-A942BBE06BFC}" type="datetimeFigureOut">
               <a:rPr lang="zh-TW" altLang="en-US" smtClean="0"/>
-              <a:t>2021/6/18</a:t>
+              <a:t>2021/6/19</a:t>
             </a:fld>
             <a:endParaRPr lang="zh-TW" altLang="en-US"/>
           </a:p>
@@ -8358,100 +8526,6 @@
           <p:cNvPr id="2" name="標題 1">
             <a:extLst>
               <a:ext uri="{FF2B5EF4-FFF2-40B4-BE49-F238E27FC236}">
-                <a16:creationId xmlns:a16="http://schemas.microsoft.com/office/drawing/2014/main" id="{BDE13C82-3312-430A-B4ED-0C10A7685B8E}"/>
-              </a:ext>
-            </a:extLst>
-          </p:cNvPr>
-          <p:cNvSpPr>
-            <a:spLocks noGrp="1"/>
-          </p:cNvSpPr>
-          <p:nvPr>
-            <p:ph type="title"/>
-          </p:nvPr>
-        </p:nvSpPr>
-        <p:spPr/>
-        <p:txBody>
-          <a:bodyPr/>
-          <a:lstStyle/>
-          <a:p>
-            <a:r>
-              <a:rPr lang="en-US" altLang="zh-TW" dirty="0"/>
-              <a:t>Area Comparison</a:t>
-            </a:r>
-            <a:endParaRPr lang="zh-TW" altLang="en-US" dirty="0"/>
-          </a:p>
-        </p:txBody>
-      </p:sp>
-      <p:pic>
-        <p:nvPicPr>
-          <p:cNvPr id="5" name="內容版面配置區 4">
-            <a:extLst>
-              <a:ext uri="{FF2B5EF4-FFF2-40B4-BE49-F238E27FC236}">
-                <a16:creationId xmlns:a16="http://schemas.microsoft.com/office/drawing/2014/main" id="{A60E679B-A991-4F38-AD07-EFA01C31AF1D}"/>
-              </a:ext>
-            </a:extLst>
-          </p:cNvPr>
-          <p:cNvPicPr>
-            <a:picLocks noGrp="1" noChangeAspect="1"/>
-          </p:cNvPicPr>
-          <p:nvPr>
-            <p:ph idx="1"/>
-          </p:nvPr>
-        </p:nvPicPr>
-        <p:blipFill>
-          <a:blip r:embed="rId2">
-            <a:extLst>
-              <a:ext uri="{28A0092B-C50C-407E-A947-70E740481C1C}">
-                <a14:useLocalDpi xmlns:a14="http://schemas.microsoft.com/office/drawing/2010/main" val="0"/>
-              </a:ext>
-            </a:extLst>
-          </a:blip>
-          <a:stretch>
-            <a:fillRect/>
-          </a:stretch>
-        </p:blipFill>
-        <p:spPr>
-          <a:xfrm>
-            <a:off x="677334" y="1521395"/>
-            <a:ext cx="8448911" cy="4299264"/>
-          </a:xfrm>
-        </p:spPr>
-      </p:pic>
-    </p:spTree>
-    <p:extLst>
-      <p:ext uri="{BB962C8B-B14F-4D97-AF65-F5344CB8AC3E}">
-        <p14:creationId xmlns:p14="http://schemas.microsoft.com/office/powerpoint/2010/main" val="1647461720"/>
-      </p:ext>
-    </p:extLst>
-  </p:cSld>
-  <p:clrMapOvr>
-    <a:masterClrMapping/>
-  </p:clrMapOvr>
-</p:sld>
-</file>
-
-<file path=ppt/slides/slide25.xml><?xml version="1.0" encoding="utf-8"?>
-<p:sld xmlns:a="http://schemas.openxmlformats.org/drawingml/2006/main" xmlns:r="http://schemas.openxmlformats.org/officeDocument/2006/relationships" xmlns:p="http://schemas.openxmlformats.org/presentationml/2006/main">
-  <p:cSld>
-    <p:spTree>
-      <p:nvGrpSpPr>
-        <p:cNvPr id="1" name=""/>
-        <p:cNvGrpSpPr/>
-        <p:nvPr/>
-      </p:nvGrpSpPr>
-      <p:grpSpPr>
-        <a:xfrm>
-          <a:off x="0" y="0"/>
-          <a:ext cx="0" cy="0"/>
-          <a:chOff x="0" y="0"/>
-          <a:chExt cx="0" cy="0"/>
-        </a:xfrm>
-      </p:grpSpPr>
-      <p:sp>
-        <p:nvSpPr>
-          <p:cNvPr id="2" name="標題 1">
-            <a:extLst>
-              <a:ext uri="{FF2B5EF4-FFF2-40B4-BE49-F238E27FC236}">
                 <a16:creationId xmlns:a16="http://schemas.microsoft.com/office/drawing/2014/main" id="{CC495335-D1C6-4E88-86F1-F0C5B118D7F8}"/>
               </a:ext>
             </a:extLst>
@@ -8504,7 +8578,7 @@
           <a:p>
             <a:r>
               <a:rPr lang="en-US" altLang="zh-TW" dirty="0"/>
-              <a:t>Reuse version need extra area to place </a:t>
+              <a:t>Row-based buffer version need extra area to place </a:t>
             </a:r>
           </a:p>
           <a:p>
@@ -8517,7 +8591,7 @@
           <a:p>
             <a:r>
               <a:rPr lang="en-US" altLang="zh-TW" dirty="0"/>
-              <a:t>Both version has same area of convolution data path (MAC)</a:t>
+              <a:t>Both version has same area of data path (MAC)</a:t>
             </a:r>
           </a:p>
           <a:p>
@@ -8607,6 +8681,92 @@
 </p:sld>
 </file>
 
+<file path=ppt/slides/slide25.xml><?xml version="1.0" encoding="utf-8"?>
+<p:sld xmlns:a="http://schemas.openxmlformats.org/drawingml/2006/main" xmlns:r="http://schemas.openxmlformats.org/officeDocument/2006/relationships" xmlns:p="http://schemas.openxmlformats.org/presentationml/2006/main">
+  <p:cSld>
+    <p:spTree>
+      <p:nvGrpSpPr>
+        <p:cNvPr id="1" name=""/>
+        <p:cNvGrpSpPr/>
+        <p:nvPr/>
+      </p:nvGrpSpPr>
+      <p:grpSpPr>
+        <a:xfrm>
+          <a:off x="0" y="0"/>
+          <a:ext cx="0" cy="0"/>
+          <a:chOff x="0" y="0"/>
+          <a:chExt cx="0" cy="0"/>
+        </a:xfrm>
+      </p:grpSpPr>
+      <p:sp>
+        <p:nvSpPr>
+          <p:cNvPr id="2" name="標題 1">
+            <a:extLst>
+              <a:ext uri="{FF2B5EF4-FFF2-40B4-BE49-F238E27FC236}">
+                <a16:creationId xmlns:a16="http://schemas.microsoft.com/office/drawing/2014/main" id="{C0E5ACC7-9957-40EC-AEA1-F34356554101}"/>
+              </a:ext>
+            </a:extLst>
+          </p:cNvPr>
+          <p:cNvSpPr>
+            <a:spLocks noGrp="1"/>
+          </p:cNvSpPr>
+          <p:nvPr>
+            <p:ph type="ctrTitle"/>
+          </p:nvPr>
+        </p:nvSpPr>
+        <p:spPr/>
+        <p:txBody>
+          <a:bodyPr>
+            <a:normAutofit/>
+          </a:bodyPr>
+          <a:lstStyle/>
+          <a:p>
+            <a:r>
+              <a:rPr lang="en-US" altLang="zh-TW" sz="3600" dirty="0"/>
+              <a:t>DNN in RISCV-VP</a:t>
+            </a:r>
+            <a:endParaRPr lang="zh-TW" altLang="en-US" sz="3600" dirty="0"/>
+          </a:p>
+        </p:txBody>
+      </p:sp>
+      <p:sp>
+        <p:nvSpPr>
+          <p:cNvPr id="3" name="副標題 2">
+            <a:extLst>
+              <a:ext uri="{FF2B5EF4-FFF2-40B4-BE49-F238E27FC236}">
+                <a16:creationId xmlns:a16="http://schemas.microsoft.com/office/drawing/2014/main" id="{756BE3ED-DE6C-4876-82A7-ADB151A4A885}"/>
+              </a:ext>
+            </a:extLst>
+          </p:cNvPr>
+          <p:cNvSpPr>
+            <a:spLocks noGrp="1"/>
+          </p:cNvSpPr>
+          <p:nvPr>
+            <p:ph type="subTitle" idx="1"/>
+          </p:nvPr>
+        </p:nvSpPr>
+        <p:spPr/>
+        <p:txBody>
+          <a:bodyPr/>
+          <a:lstStyle/>
+          <a:p>
+            <a:endParaRPr lang="zh-TW" altLang="en-US" dirty="0"/>
+          </a:p>
+        </p:txBody>
+      </p:sp>
+    </p:spTree>
+    <p:extLst>
+      <p:ext uri="{BB962C8B-B14F-4D97-AF65-F5344CB8AC3E}">
+        <p14:creationId xmlns:p14="http://schemas.microsoft.com/office/powerpoint/2010/main" val="2050036804"/>
+      </p:ext>
+    </p:extLst>
+  </p:cSld>
+  <p:clrMapOvr>
+    <a:masterClrMapping/>
+  </p:clrMapOvr>
+</p:sld>
+</file>
+
 <file path=ppt/slides/slide26.xml><?xml version="1.0" encoding="utf-8"?>
 <p:sld xmlns:a="http://schemas.openxmlformats.org/drawingml/2006/main" xmlns:r="http://schemas.openxmlformats.org/officeDocument/2006/relationships" xmlns:p="http://schemas.openxmlformats.org/presentationml/2006/main">
   <p:cSld>
@@ -8629,7 +8789,7 @@
           <p:cNvPr id="2" name="標題 1">
             <a:extLst>
               <a:ext uri="{FF2B5EF4-FFF2-40B4-BE49-F238E27FC236}">
-                <a16:creationId xmlns:a16="http://schemas.microsoft.com/office/drawing/2014/main" id="{C0E5ACC7-9957-40EC-AEA1-F34356554101}"/>
+                <a16:creationId xmlns:a16="http://schemas.microsoft.com/office/drawing/2014/main" id="{92D11BE6-F47E-4331-B350-8D0C1B579AB8}"/>
               </a:ext>
             </a:extLst>
           </p:cNvPr>
@@ -8637,53 +8797,86 @@
             <a:spLocks noGrp="1"/>
           </p:cNvSpPr>
           <p:nvPr>
-            <p:ph type="ctrTitle"/>
-          </p:nvPr>
-        </p:nvSpPr>
-        <p:spPr/>
-        <p:txBody>
-          <a:bodyPr>
-            <a:normAutofit/>
-          </a:bodyPr>
-          <a:lstStyle/>
-          <a:p>
-            <a:r>
-              <a:rPr lang="en-US" altLang="zh-TW" sz="3600" dirty="0"/>
-              <a:t>DNN in TLM</a:t>
-            </a:r>
-            <a:endParaRPr lang="zh-TW" altLang="en-US" sz="3600" dirty="0"/>
-          </a:p>
-        </p:txBody>
-      </p:sp>
-      <p:sp>
-        <p:nvSpPr>
-          <p:cNvPr id="3" name="副標題 2">
+            <p:ph type="title"/>
+          </p:nvPr>
+        </p:nvSpPr>
+        <p:spPr/>
+        <p:txBody>
+          <a:bodyPr/>
+          <a:lstStyle/>
+          <a:p>
+            <a:r>
+              <a:rPr lang="en-US" altLang="zh-TW" dirty="0"/>
+              <a:t>Different-Cores Simulation Times</a:t>
+            </a:r>
+            <a:endParaRPr lang="zh-TW" altLang="en-US" dirty="0"/>
+          </a:p>
+        </p:txBody>
+      </p:sp>
+      <p:pic>
+        <p:nvPicPr>
+          <p:cNvPr id="9" name="圖片 8">
             <a:extLst>
               <a:ext uri="{FF2B5EF4-FFF2-40B4-BE49-F238E27FC236}">
-                <a16:creationId xmlns:a16="http://schemas.microsoft.com/office/drawing/2014/main" id="{756BE3ED-DE6C-4876-82A7-ADB151A4A885}"/>
+                <a16:creationId xmlns:a16="http://schemas.microsoft.com/office/drawing/2014/main" id="{A606931D-54CE-4DBA-905E-9E6290079BC0}"/>
               </a:ext>
             </a:extLst>
           </p:cNvPr>
-          <p:cNvSpPr>
-            <a:spLocks noGrp="1"/>
-          </p:cNvSpPr>
-          <p:nvPr>
-            <p:ph type="subTitle" idx="1"/>
-          </p:nvPr>
-        </p:nvSpPr>
-        <p:spPr/>
-        <p:txBody>
-          <a:bodyPr/>
-          <a:lstStyle/>
-          <a:p>
-            <a:endParaRPr lang="zh-TW" altLang="en-US" dirty="0"/>
-          </a:p>
-        </p:txBody>
-      </p:sp>
+          <p:cNvPicPr>
+            <a:picLocks noChangeAspect="1"/>
+          </p:cNvPicPr>
+          <p:nvPr/>
+        </p:nvPicPr>
+        <p:blipFill>
+          <a:blip r:embed="rId3"/>
+          <a:stretch>
+            <a:fillRect/>
+          </a:stretch>
+        </p:blipFill>
+        <p:spPr>
+          <a:xfrm>
+            <a:off x="863382" y="1807308"/>
+            <a:ext cx="8670649" cy="1577470"/>
+          </a:xfrm>
+          <a:prstGeom prst="rect">
+            <a:avLst/>
+          </a:prstGeom>
+        </p:spPr>
+      </p:pic>
+      <p:pic>
+        <p:nvPicPr>
+          <p:cNvPr id="10" name="圖片 9">
+            <a:extLst>
+              <a:ext uri="{FF2B5EF4-FFF2-40B4-BE49-F238E27FC236}">
+                <a16:creationId xmlns:a16="http://schemas.microsoft.com/office/drawing/2014/main" id="{9FCFBFE1-629A-4132-97D0-0C0A147CB30B}"/>
+              </a:ext>
+            </a:extLst>
+          </p:cNvPr>
+          <p:cNvPicPr>
+            <a:picLocks noChangeAspect="1"/>
+          </p:cNvPicPr>
+          <p:nvPr/>
+        </p:nvPicPr>
+        <p:blipFill>
+          <a:blip r:embed="rId4"/>
+          <a:stretch>
+            <a:fillRect/>
+          </a:stretch>
+        </p:blipFill>
+        <p:spPr>
+          <a:xfrm>
+            <a:off x="863382" y="3511883"/>
+            <a:ext cx="8670649" cy="1621692"/>
+          </a:xfrm>
+          <a:prstGeom prst="rect">
+            <a:avLst/>
+          </a:prstGeom>
+        </p:spPr>
+      </p:pic>
     </p:spTree>
     <p:extLst>
       <p:ext uri="{BB962C8B-B14F-4D97-AF65-F5344CB8AC3E}">
-        <p14:creationId xmlns:p14="http://schemas.microsoft.com/office/powerpoint/2010/main" val="2050036804"/>
+        <p14:creationId xmlns:p14="http://schemas.microsoft.com/office/powerpoint/2010/main" val="3249635447"/>
       </p:ext>
     </p:extLst>
   </p:cSld>
@@ -8715,7 +8908,7 @@
           <p:cNvPr id="2" name="標題 1">
             <a:extLst>
               <a:ext uri="{FF2B5EF4-FFF2-40B4-BE49-F238E27FC236}">
-                <a16:creationId xmlns:a16="http://schemas.microsoft.com/office/drawing/2014/main" id="{B6F36D85-553A-43BA-805F-CE484DB608F9}"/>
+                <a16:creationId xmlns:a16="http://schemas.microsoft.com/office/drawing/2014/main" id="{92D11BE6-F47E-4331-B350-8D0C1B579AB8}"/>
               </a:ext>
             </a:extLst>
           </p:cNvPr>
@@ -8733,15 +8926,7 @@
           <a:p>
             <a:r>
               <a:rPr lang="en-US" altLang="zh-TW" dirty="0"/>
-              <a:t>Variable IO latency and Fixed </a:t>
-            </a:r>
-            <a:r>
-              <a:rPr lang="en-US" altLang="zh-TW" dirty="0" err="1"/>
-              <a:t>hw</a:t>
-            </a:r>
-            <a:r>
-              <a:rPr lang="en-US" altLang="zh-TW" dirty="0"/>
-              <a:t> latency</a:t>
+              <a:t>Different-Ways Simulation Times</a:t>
             </a:r>
             <a:endParaRPr lang="zh-TW" altLang="en-US" dirty="0"/>
           </a:p>
@@ -8749,10 +8934,10 @@
       </p:sp>
       <p:pic>
         <p:nvPicPr>
-          <p:cNvPr id="5" name="圖片 4">
+          <p:cNvPr id="12" name="圖片 11">
             <a:extLst>
               <a:ext uri="{FF2B5EF4-FFF2-40B4-BE49-F238E27FC236}">
-                <a16:creationId xmlns:a16="http://schemas.microsoft.com/office/drawing/2014/main" id="{A84C46E1-CD46-4133-AD17-F39B06B162E7}"/>
+                <a16:creationId xmlns:a16="http://schemas.microsoft.com/office/drawing/2014/main" id="{91AA9AD1-689A-4639-82CB-490C406C3899}"/>
               </a:ext>
             </a:extLst>
           </p:cNvPr>
@@ -8762,15 +8947,15 @@
           <p:nvPr/>
         </p:nvPicPr>
         <p:blipFill>
-          <a:blip r:embed="rId2"/>
+          <a:blip r:embed="rId3"/>
           <a:stretch>
             <a:fillRect/>
           </a:stretch>
         </p:blipFill>
         <p:spPr>
           <a:xfrm>
-            <a:off x="677334" y="1930400"/>
-            <a:ext cx="5418666" cy="504062"/>
+            <a:off x="863382" y="1780141"/>
+            <a:ext cx="8410620" cy="1532085"/>
           </a:xfrm>
           <a:prstGeom prst="rect">
             <a:avLst/>
@@ -8779,30 +8964,28 @@
       </p:pic>
       <p:pic>
         <p:nvPicPr>
-          <p:cNvPr id="7" name="內容版面配置區 6">
+          <p:cNvPr id="13" name="圖片 12">
             <a:extLst>
               <a:ext uri="{FF2B5EF4-FFF2-40B4-BE49-F238E27FC236}">
-                <a16:creationId xmlns:a16="http://schemas.microsoft.com/office/drawing/2014/main" id="{832312A0-4BCD-405C-9F40-D2B1A9610C4A}"/>
+                <a16:creationId xmlns:a16="http://schemas.microsoft.com/office/drawing/2014/main" id="{3F5EAE9F-7678-4FCD-9EEF-B0883339ACE2}"/>
               </a:ext>
             </a:extLst>
           </p:cNvPr>
           <p:cNvPicPr>
-            <a:picLocks noGrp="1" noChangeAspect="1"/>
+            <a:picLocks noChangeAspect="1"/>
           </p:cNvPicPr>
-          <p:nvPr>
-            <p:ph idx="1"/>
-          </p:nvPr>
+          <p:nvPr/>
         </p:nvPicPr>
         <p:blipFill>
-          <a:blip r:embed="rId3"/>
+          <a:blip r:embed="rId4"/>
           <a:stretch>
             <a:fillRect/>
           </a:stretch>
         </p:blipFill>
         <p:spPr>
           <a:xfrm>
-            <a:off x="677334" y="2824701"/>
-            <a:ext cx="8596312" cy="2553210"/>
+            <a:off x="841015" y="3511884"/>
+            <a:ext cx="8432991" cy="1565976"/>
           </a:xfrm>
           <a:prstGeom prst="rect">
             <a:avLst/>
@@ -8812,7 +8995,7 @@
     </p:spTree>
     <p:extLst>
       <p:ext uri="{BB962C8B-B14F-4D97-AF65-F5344CB8AC3E}">
-        <p14:creationId xmlns:p14="http://schemas.microsoft.com/office/powerpoint/2010/main" val="1921167925"/>
+        <p14:creationId xmlns:p14="http://schemas.microsoft.com/office/powerpoint/2010/main" val="2773548817"/>
       </p:ext>
     </p:extLst>
   </p:cSld>
@@ -8844,7 +9027,7 @@
           <p:cNvPr id="2" name="標題 1">
             <a:extLst>
               <a:ext uri="{FF2B5EF4-FFF2-40B4-BE49-F238E27FC236}">
-                <a16:creationId xmlns:a16="http://schemas.microsoft.com/office/drawing/2014/main" id="{92D11BE6-F47E-4331-B350-8D0C1B579AB8}"/>
+                <a16:creationId xmlns:a16="http://schemas.microsoft.com/office/drawing/2014/main" id="{3B70EF23-314C-436D-960D-704533395B81}"/>
               </a:ext>
             </a:extLst>
           </p:cNvPr>
@@ -8862,71 +9045,51 @@
           <a:p>
             <a:r>
               <a:rPr lang="en-US" altLang="zh-TW" dirty="0"/>
-              <a:t>Reuse Model Simulation Times</a:t>
+              <a:t>Comparison - Convolution</a:t>
             </a:r>
             <a:endParaRPr lang="zh-TW" altLang="en-US" dirty="0"/>
           </a:p>
         </p:txBody>
       </p:sp>
-      <p:sp>
-        <p:nvSpPr>
-          <p:cNvPr id="5" name="內容版面配置區 4">
+      <p:pic>
+        <p:nvPicPr>
+          <p:cNvPr id="6" name="內容版面配置區 5">
             <a:extLst>
               <a:ext uri="{FF2B5EF4-FFF2-40B4-BE49-F238E27FC236}">
-                <a16:creationId xmlns:a16="http://schemas.microsoft.com/office/drawing/2014/main" id="{518A4CB0-E712-4E7D-818E-EED4BAE479E0}"/>
-              </a:ext>
-            </a:extLst>
-          </p:cNvPr>
-          <p:cNvSpPr>
-            <a:spLocks noGrp="1"/>
-          </p:cNvSpPr>
-          <p:nvPr>
-            <p:ph idx="1"/>
-          </p:nvPr>
-        </p:nvSpPr>
-        <p:spPr/>
-        <p:txBody>
-          <a:bodyPr/>
-          <a:lstStyle/>
-          <a:p>
-            <a:endParaRPr lang="zh-TW" altLang="en-US" dirty="0"/>
-          </a:p>
-        </p:txBody>
-      </p:sp>
-      <p:pic>
-        <p:nvPicPr>
-          <p:cNvPr id="4" name="圖片 3">
-            <a:extLst>
-              <a:ext uri="{FF2B5EF4-FFF2-40B4-BE49-F238E27FC236}">
-                <a16:creationId xmlns:a16="http://schemas.microsoft.com/office/drawing/2014/main" id="{C80CE152-A3BB-4FF5-A7DE-531DE5A3F2B8}"/>
+                <a16:creationId xmlns:a16="http://schemas.microsoft.com/office/drawing/2014/main" id="{9BBEC0DC-EA81-4909-9A35-FE4EAEC77533}"/>
               </a:ext>
             </a:extLst>
           </p:cNvPr>
           <p:cNvPicPr>
-            <a:picLocks noChangeAspect="1"/>
+            <a:picLocks noGrp="1" noChangeAspect="1"/>
           </p:cNvPicPr>
-          <p:nvPr/>
+          <p:nvPr>
+            <p:ph idx="1"/>
+          </p:nvPr>
         </p:nvPicPr>
         <p:blipFill>
-          <a:blip r:embed="rId2"/>
+          <a:blip r:embed="rId2">
+            <a:extLst>
+              <a:ext uri="{28A0092B-C50C-407E-A947-70E740481C1C}">
+                <a14:useLocalDpi xmlns:a14="http://schemas.microsoft.com/office/drawing/2010/main" val="0"/>
+              </a:ext>
+            </a:extLst>
+          </a:blip>
           <a:stretch>
             <a:fillRect/>
           </a:stretch>
         </p:blipFill>
         <p:spPr>
           <a:xfrm>
-            <a:off x="677334" y="2160589"/>
-            <a:ext cx="8596668" cy="2276491"/>
+            <a:off x="1160646" y="1270000"/>
+            <a:ext cx="7630044" cy="5086696"/>
           </a:xfrm>
-          <a:prstGeom prst="rect">
-            <a:avLst/>
-          </a:prstGeom>
         </p:spPr>
       </p:pic>
     </p:spTree>
     <p:extLst>
       <p:ext uri="{BB962C8B-B14F-4D97-AF65-F5344CB8AC3E}">
-        <p14:creationId xmlns:p14="http://schemas.microsoft.com/office/powerpoint/2010/main" val="3249635447"/>
+        <p14:creationId xmlns:p14="http://schemas.microsoft.com/office/powerpoint/2010/main" val="1440392167"/>
       </p:ext>
     </p:extLst>
   </p:cSld>
@@ -8976,71 +9139,51 @@
           <a:p>
             <a:r>
               <a:rPr lang="en-US" altLang="zh-TW" dirty="0"/>
-              <a:t>Non-Reuse Model Simulation Times</a:t>
+              <a:t>Comparison – Fully Connection</a:t>
             </a:r>
             <a:endParaRPr lang="zh-TW" altLang="en-US" dirty="0"/>
           </a:p>
         </p:txBody>
       </p:sp>
-      <p:sp>
-        <p:nvSpPr>
-          <p:cNvPr id="3" name="內容版面配置區 2">
+      <p:pic>
+        <p:nvPicPr>
+          <p:cNvPr id="10" name="內容版面配置區 6">
             <a:extLst>
               <a:ext uri="{FF2B5EF4-FFF2-40B4-BE49-F238E27FC236}">
-                <a16:creationId xmlns:a16="http://schemas.microsoft.com/office/drawing/2014/main" id="{46AF8B3C-4348-46AB-A4AB-F4E6DC547E52}"/>
-              </a:ext>
-            </a:extLst>
-          </p:cNvPr>
-          <p:cNvSpPr>
-            <a:spLocks noGrp="1"/>
-          </p:cNvSpPr>
-          <p:nvPr>
-            <p:ph idx="1"/>
-          </p:nvPr>
-        </p:nvSpPr>
-        <p:spPr/>
-        <p:txBody>
-          <a:bodyPr/>
-          <a:lstStyle/>
-          <a:p>
-            <a:endParaRPr lang="zh-TW" altLang="en-US" dirty="0"/>
-          </a:p>
-        </p:txBody>
-      </p:sp>
-      <p:pic>
-        <p:nvPicPr>
-          <p:cNvPr id="5" name="圖片 4">
-            <a:extLst>
-              <a:ext uri="{FF2B5EF4-FFF2-40B4-BE49-F238E27FC236}">
-                <a16:creationId xmlns:a16="http://schemas.microsoft.com/office/drawing/2014/main" id="{CB015F9A-9D8C-45D3-A116-C3AE519E2E42}"/>
+                <a16:creationId xmlns:a16="http://schemas.microsoft.com/office/drawing/2014/main" id="{23D85F90-B981-4A41-9188-8001583B0037}"/>
               </a:ext>
             </a:extLst>
           </p:cNvPr>
           <p:cNvPicPr>
-            <a:picLocks noChangeAspect="1"/>
+            <a:picLocks noGrp="1" noChangeAspect="1"/>
           </p:cNvPicPr>
-          <p:nvPr/>
+          <p:nvPr>
+            <p:ph idx="1"/>
+          </p:nvPr>
         </p:nvPicPr>
         <p:blipFill>
-          <a:blip r:embed="rId2"/>
+          <a:blip r:embed="rId2">
+            <a:extLst>
+              <a:ext uri="{28A0092B-C50C-407E-A947-70E740481C1C}">
+                <a14:useLocalDpi xmlns:a14="http://schemas.microsoft.com/office/drawing/2010/main" val="0"/>
+              </a:ext>
+            </a:extLst>
+          </a:blip>
           <a:stretch>
             <a:fillRect/>
           </a:stretch>
         </p:blipFill>
         <p:spPr>
           <a:xfrm>
-            <a:off x="677334" y="2155509"/>
-            <a:ext cx="8596668" cy="2281376"/>
+            <a:off x="1160646" y="1275862"/>
+            <a:ext cx="7630044" cy="5086696"/>
           </a:xfrm>
-          <a:prstGeom prst="rect">
-            <a:avLst/>
-          </a:prstGeom>
         </p:spPr>
       </p:pic>
     </p:spTree>
     <p:extLst>
       <p:ext uri="{BB962C8B-B14F-4D97-AF65-F5344CB8AC3E}">
-        <p14:creationId xmlns:p14="http://schemas.microsoft.com/office/powerpoint/2010/main" val="2559581469"/>
+        <p14:creationId xmlns:p14="http://schemas.microsoft.com/office/powerpoint/2010/main" val="1775172278"/>
       </p:ext>
     </p:extLst>
   </p:cSld>
@@ -9156,66 +9299,12 @@
           <a:chExt cx="0" cy="0"/>
         </a:xfrm>
       </p:grpSpPr>
-      <p:sp>
-        <p:nvSpPr>
-          <p:cNvPr id="2" name="標題 1">
-            <a:extLst>
-              <a:ext uri="{FF2B5EF4-FFF2-40B4-BE49-F238E27FC236}">
-                <a16:creationId xmlns:a16="http://schemas.microsoft.com/office/drawing/2014/main" id="{978971AD-B35F-4007-8E3E-E4A97F89D4A2}"/>
-              </a:ext>
-            </a:extLst>
-          </p:cNvPr>
-          <p:cNvSpPr>
-            <a:spLocks noGrp="1"/>
-          </p:cNvSpPr>
-          <p:nvPr>
-            <p:ph type="title"/>
-          </p:nvPr>
-        </p:nvSpPr>
-        <p:spPr/>
-        <p:txBody>
-          <a:bodyPr/>
-          <a:lstStyle/>
-          <a:p>
-            <a:r>
-              <a:rPr lang="en-US" altLang="zh-TW" dirty="0"/>
-              <a:t>Comparison</a:t>
-            </a:r>
-            <a:endParaRPr lang="zh-TW" altLang="en-US" dirty="0"/>
-          </a:p>
-        </p:txBody>
-      </p:sp>
-      <p:sp>
-        <p:nvSpPr>
-          <p:cNvPr id="3" name="內容版面配置區 2">
-            <a:extLst>
-              <a:ext uri="{FF2B5EF4-FFF2-40B4-BE49-F238E27FC236}">
-                <a16:creationId xmlns:a16="http://schemas.microsoft.com/office/drawing/2014/main" id="{07E326D1-AD59-483F-A1B8-BC8D179787B6}"/>
-              </a:ext>
-            </a:extLst>
-          </p:cNvPr>
-          <p:cNvSpPr>
-            <a:spLocks noGrp="1"/>
-          </p:cNvSpPr>
-          <p:nvPr>
-            <p:ph idx="1"/>
-          </p:nvPr>
-        </p:nvSpPr>
-        <p:spPr/>
-        <p:txBody>
-          <a:bodyPr/>
-          <a:lstStyle/>
-          <a:p>
-            <a:endParaRPr lang="zh-TW" altLang="en-US" dirty="0"/>
-          </a:p>
-        </p:txBody>
-      </p:sp>
       <p:pic>
         <p:nvPicPr>
           <p:cNvPr id="4" name="圖片 3">
             <a:extLst>
               <a:ext uri="{FF2B5EF4-FFF2-40B4-BE49-F238E27FC236}">
-                <a16:creationId xmlns:a16="http://schemas.microsoft.com/office/drawing/2014/main" id="{2FFC6BD9-02BC-4D37-A720-1C52D21AB718}"/>
+                <a16:creationId xmlns:a16="http://schemas.microsoft.com/office/drawing/2014/main" id="{D28FF654-8760-4A12-A330-8EE28CD0885C}"/>
               </a:ext>
             </a:extLst>
           </p:cNvPr>
@@ -9225,25 +9314,60 @@
           <p:nvPr/>
         </p:nvPicPr>
         <p:blipFill>
-          <a:blip r:embed="rId2"/>
+          <a:blip r:embed="rId2">
+            <a:extLst>
+              <a:ext uri="{28A0092B-C50C-407E-A947-70E740481C1C}">
+                <a14:useLocalDpi xmlns:a14="http://schemas.microsoft.com/office/drawing/2010/main" val="0"/>
+              </a:ext>
+            </a:extLst>
+          </a:blip>
           <a:stretch>
             <a:fillRect/>
           </a:stretch>
         </p:blipFill>
         <p:spPr>
           <a:xfrm>
-            <a:off x="677334" y="2160589"/>
-            <a:ext cx="8596668" cy="2525480"/>
+            <a:off x="1160647" y="1270000"/>
+            <a:ext cx="7630044" cy="5086696"/>
           </a:xfrm>
           <a:prstGeom prst="rect">
             <a:avLst/>
           </a:prstGeom>
         </p:spPr>
       </p:pic>
+      <p:sp>
+        <p:nvSpPr>
+          <p:cNvPr id="2" name="標題 1">
+            <a:extLst>
+              <a:ext uri="{FF2B5EF4-FFF2-40B4-BE49-F238E27FC236}">
+                <a16:creationId xmlns:a16="http://schemas.microsoft.com/office/drawing/2014/main" id="{3B70EF23-314C-436D-960D-704533395B81}"/>
+              </a:ext>
+            </a:extLst>
+          </p:cNvPr>
+          <p:cNvSpPr>
+            <a:spLocks noGrp="1"/>
+          </p:cNvSpPr>
+          <p:nvPr>
+            <p:ph type="title"/>
+          </p:nvPr>
+        </p:nvSpPr>
+        <p:spPr/>
+        <p:txBody>
+          <a:bodyPr/>
+          <a:lstStyle/>
+          <a:p>
+            <a:r>
+              <a:rPr lang="en-US" altLang="zh-TW" dirty="0"/>
+              <a:t>Comparison – Entire DNN</a:t>
+            </a:r>
+            <a:endParaRPr lang="zh-TW" altLang="en-US" dirty="0"/>
+          </a:p>
+        </p:txBody>
+      </p:sp>
     </p:spTree>
     <p:extLst>
       <p:ext uri="{BB962C8B-B14F-4D97-AF65-F5344CB8AC3E}">
-        <p14:creationId xmlns:p14="http://schemas.microsoft.com/office/powerpoint/2010/main" val="439766877"/>
+        <p14:creationId xmlns:p14="http://schemas.microsoft.com/office/powerpoint/2010/main" val="3748591632"/>
       </p:ext>
     </p:extLst>
   </p:cSld>
@@ -9275,7 +9399,7 @@
           <p:cNvPr id="2" name="標題 1">
             <a:extLst>
               <a:ext uri="{FF2B5EF4-FFF2-40B4-BE49-F238E27FC236}">
-                <a16:creationId xmlns:a16="http://schemas.microsoft.com/office/drawing/2014/main" id="{3B70EF23-314C-436D-960D-704533395B81}"/>
+                <a16:creationId xmlns:a16="http://schemas.microsoft.com/office/drawing/2014/main" id="{CA59DB02-2FE8-4E70-83D7-D958A075B75F}"/>
               </a:ext>
             </a:extLst>
           </p:cNvPr>
@@ -9293,7 +9417,7 @@
           <a:p>
             <a:r>
               <a:rPr lang="en-US" altLang="zh-TW" dirty="0"/>
-              <a:t>Growing rate of two method</a:t>
+              <a:t>Comparison - Overview</a:t>
             </a:r>
             <a:endParaRPr lang="zh-TW" altLang="en-US" dirty="0"/>
           </a:p>
@@ -9301,10 +9425,10 @@
       </p:sp>
       <p:pic>
         <p:nvPicPr>
-          <p:cNvPr id="7" name="內容版面配置區 6">
+          <p:cNvPr id="9" name="內容版面配置區 8">
             <a:extLst>
               <a:ext uri="{FF2B5EF4-FFF2-40B4-BE49-F238E27FC236}">
-                <a16:creationId xmlns:a16="http://schemas.microsoft.com/office/drawing/2014/main" id="{97D2DB84-A2A3-48A9-9474-24D542FBB841}"/>
+                <a16:creationId xmlns:a16="http://schemas.microsoft.com/office/drawing/2014/main" id="{461E5360-D204-433F-8599-90CB04A6494D}"/>
               </a:ext>
             </a:extLst>
           </p:cNvPr>
@@ -9329,15 +9453,15 @@
         </p:blipFill>
         <p:spPr>
           <a:xfrm>
-            <a:off x="677335" y="1591628"/>
-            <a:ext cx="8596668" cy="4143863"/>
+            <a:off x="1209155" y="1232042"/>
+            <a:ext cx="7524537" cy="5016358"/>
           </a:xfrm>
         </p:spPr>
       </p:pic>
     </p:spTree>
     <p:extLst>
       <p:ext uri="{BB962C8B-B14F-4D97-AF65-F5344CB8AC3E}">
-        <p14:creationId xmlns:p14="http://schemas.microsoft.com/office/powerpoint/2010/main" val="1440392167"/>
+        <p14:creationId xmlns:p14="http://schemas.microsoft.com/office/powerpoint/2010/main" val="2153508393"/>
       </p:ext>
     </p:extLst>
   </p:cSld>
@@ -9387,7 +9511,7 @@
           <a:p>
             <a:r>
               <a:rPr lang="en-US" altLang="zh-TW" dirty="0"/>
-              <a:t>Simulation Result</a:t>
+              <a:t>Simulation Results</a:t>
             </a:r>
             <a:endParaRPr lang="zh-TW" altLang="en-US" dirty="0"/>
           </a:p>
@@ -9395,10 +9519,10 @@
       </p:sp>
       <p:pic>
         <p:nvPicPr>
-          <p:cNvPr id="3" name="圖片 2">
+          <p:cNvPr id="4" name="圖片 3">
             <a:extLst>
               <a:ext uri="{FF2B5EF4-FFF2-40B4-BE49-F238E27FC236}">
-                <a16:creationId xmlns:a16="http://schemas.microsoft.com/office/drawing/2014/main" id="{354F323A-D2CF-4DCD-8B55-19EDEFAC7980}"/>
+                <a16:creationId xmlns:a16="http://schemas.microsoft.com/office/drawing/2014/main" id="{4B5279A2-92F2-4FF2-9503-0CC53A087D46}"/>
               </a:ext>
             </a:extLst>
           </p:cNvPr>
@@ -9415,8 +9539,38 @@
         </p:blipFill>
         <p:spPr>
           <a:xfrm>
-            <a:off x="677334" y="1807773"/>
-            <a:ext cx="7677017" cy="4440627"/>
+            <a:off x="859729" y="1317766"/>
+            <a:ext cx="5353501" cy="4778234"/>
+          </a:xfrm>
+          <a:prstGeom prst="rect">
+            <a:avLst/>
+          </a:prstGeom>
+        </p:spPr>
+      </p:pic>
+      <p:pic>
+        <p:nvPicPr>
+          <p:cNvPr id="5" name="圖片 4">
+            <a:extLst>
+              <a:ext uri="{FF2B5EF4-FFF2-40B4-BE49-F238E27FC236}">
+                <a16:creationId xmlns:a16="http://schemas.microsoft.com/office/drawing/2014/main" id="{B1255098-D705-4949-9937-5CEC1B88BC5F}"/>
+              </a:ext>
+            </a:extLst>
+          </p:cNvPr>
+          <p:cNvPicPr>
+            <a:picLocks noChangeAspect="1"/>
+          </p:cNvPicPr>
+          <p:nvPr/>
+        </p:nvPicPr>
+        <p:blipFill>
+          <a:blip r:embed="rId3"/>
+          <a:stretch>
+            <a:fillRect/>
+          </a:stretch>
+        </p:blipFill>
+        <p:spPr>
+          <a:xfrm>
+            <a:off x="6213230" y="1317766"/>
+            <a:ext cx="2866940" cy="4778234"/>
           </a:xfrm>
           <a:prstGeom prst="rect">
             <a:avLst/>
@@ -9481,7 +9635,7 @@
           <a:p>
             <a:r>
               <a:rPr lang="en-US" altLang="zh-TW" dirty="0"/>
-              <a:t>Thank You</a:t>
+              <a:t>Thanks You</a:t>
             </a:r>
             <a:endParaRPr lang="zh-TW" altLang="en-US" dirty="0"/>
           </a:p>

</xml_diff>